<commit_message>
winding design files and some things
</commit_message>
<xml_diff>
--- a/WPT/2p-4s journal/Coil/New Microsoft PowerPoint Presentation.pptx
+++ b/WPT/2p-4s journal/Coil/New Microsoft PowerPoint Presentation.pptx
@@ -5,7 +5,7 @@
     <p:sldMasterId id="2147483648" r:id="rId1"/>
   </p:sldMasterIdLst>
   <p:notesMasterIdLst>
-    <p:notesMasterId r:id="rId17"/>
+    <p:notesMasterId r:id="rId27"/>
   </p:notesMasterIdLst>
   <p:sldIdLst>
     <p:sldId id="256" r:id="rId2"/>
@@ -23,6 +23,16 @@
     <p:sldId id="270" r:id="rId14"/>
     <p:sldId id="268" r:id="rId15"/>
     <p:sldId id="269" r:id="rId16"/>
+    <p:sldId id="271" r:id="rId17"/>
+    <p:sldId id="272" r:id="rId18"/>
+    <p:sldId id="273" r:id="rId19"/>
+    <p:sldId id="274" r:id="rId20"/>
+    <p:sldId id="275" r:id="rId21"/>
+    <p:sldId id="276" r:id="rId22"/>
+    <p:sldId id="277" r:id="rId23"/>
+    <p:sldId id="278" r:id="rId24"/>
+    <p:sldId id="279" r:id="rId25"/>
+    <p:sldId id="280" r:id="rId26"/>
   </p:sldIdLst>
   <p:sldSz cx="12192000" cy="6858000"/>
   <p:notesSz cx="6858000" cy="9144000"/>
@@ -211,7 +221,7 @@
           <a:p>
             <a:fld id="{BC55A1AA-D421-426F-B076-955CF8EF676D}" type="datetimeFigureOut">
               <a:rPr lang="en-US" smtClean="0"/>
-              <a:t>11/24/2020</a:t>
+              <a:t>11/30/2020</a:t>
             </a:fld>
             <a:endParaRPr lang="en-US"/>
           </a:p>
@@ -709,7 +719,7 @@
           <a:p>
             <a:fld id="{3D011F5A-9F5D-4561-BD0C-677A33A8589B}" type="datetimeFigureOut">
               <a:rPr lang="en-US" smtClean="0"/>
-              <a:t>11/24/2020</a:t>
+              <a:t>11/30/2020</a:t>
             </a:fld>
             <a:endParaRPr lang="en-US"/>
           </a:p>
@@ -907,7 +917,7 @@
           <a:p>
             <a:fld id="{3D011F5A-9F5D-4561-BD0C-677A33A8589B}" type="datetimeFigureOut">
               <a:rPr lang="en-US" smtClean="0"/>
-              <a:t>11/24/2020</a:t>
+              <a:t>11/30/2020</a:t>
             </a:fld>
             <a:endParaRPr lang="en-US"/>
           </a:p>
@@ -1115,7 +1125,7 @@
           <a:p>
             <a:fld id="{3D011F5A-9F5D-4561-BD0C-677A33A8589B}" type="datetimeFigureOut">
               <a:rPr lang="en-US" smtClean="0"/>
-              <a:t>11/24/2020</a:t>
+              <a:t>11/30/2020</a:t>
             </a:fld>
             <a:endParaRPr lang="en-US"/>
           </a:p>
@@ -1313,7 +1323,7 @@
           <a:p>
             <a:fld id="{3D011F5A-9F5D-4561-BD0C-677A33A8589B}" type="datetimeFigureOut">
               <a:rPr lang="en-US" smtClean="0"/>
-              <a:t>11/24/2020</a:t>
+              <a:t>11/30/2020</a:t>
             </a:fld>
             <a:endParaRPr lang="en-US"/>
           </a:p>
@@ -1588,7 +1598,7 @@
           <a:p>
             <a:fld id="{3D011F5A-9F5D-4561-BD0C-677A33A8589B}" type="datetimeFigureOut">
               <a:rPr lang="en-US" smtClean="0"/>
-              <a:t>11/24/2020</a:t>
+              <a:t>11/30/2020</a:t>
             </a:fld>
             <a:endParaRPr lang="en-US"/>
           </a:p>
@@ -1853,7 +1863,7 @@
           <a:p>
             <a:fld id="{3D011F5A-9F5D-4561-BD0C-677A33A8589B}" type="datetimeFigureOut">
               <a:rPr lang="en-US" smtClean="0"/>
-              <a:t>11/24/2020</a:t>
+              <a:t>11/30/2020</a:t>
             </a:fld>
             <a:endParaRPr lang="en-US"/>
           </a:p>
@@ -2265,7 +2275,7 @@
           <a:p>
             <a:fld id="{3D011F5A-9F5D-4561-BD0C-677A33A8589B}" type="datetimeFigureOut">
               <a:rPr lang="en-US" smtClean="0"/>
-              <a:t>11/24/2020</a:t>
+              <a:t>11/30/2020</a:t>
             </a:fld>
             <a:endParaRPr lang="en-US"/>
           </a:p>
@@ -2406,7 +2416,7 @@
           <a:p>
             <a:fld id="{3D011F5A-9F5D-4561-BD0C-677A33A8589B}" type="datetimeFigureOut">
               <a:rPr lang="en-US" smtClean="0"/>
-              <a:t>11/24/2020</a:t>
+              <a:t>11/30/2020</a:t>
             </a:fld>
             <a:endParaRPr lang="en-US"/>
           </a:p>
@@ -2519,7 +2529,7 @@
           <a:p>
             <a:fld id="{3D011F5A-9F5D-4561-BD0C-677A33A8589B}" type="datetimeFigureOut">
               <a:rPr lang="en-US" smtClean="0"/>
-              <a:t>11/24/2020</a:t>
+              <a:t>11/30/2020</a:t>
             </a:fld>
             <a:endParaRPr lang="en-US"/>
           </a:p>
@@ -2830,7 +2840,7 @@
           <a:p>
             <a:fld id="{3D011F5A-9F5D-4561-BD0C-677A33A8589B}" type="datetimeFigureOut">
               <a:rPr lang="en-US" smtClean="0"/>
-              <a:t>11/24/2020</a:t>
+              <a:t>11/30/2020</a:t>
             </a:fld>
             <a:endParaRPr lang="en-US"/>
           </a:p>
@@ -3118,7 +3128,7 @@
           <a:p>
             <a:fld id="{3D011F5A-9F5D-4561-BD0C-677A33A8589B}" type="datetimeFigureOut">
               <a:rPr lang="en-US" smtClean="0"/>
-              <a:t>11/24/2020</a:t>
+              <a:t>11/30/2020</a:t>
             </a:fld>
             <a:endParaRPr lang="en-US"/>
           </a:p>
@@ -3359,7 +3369,7 @@
           <a:p>
             <a:fld id="{3D011F5A-9F5D-4561-BD0C-677A33A8589B}" type="datetimeFigureOut">
               <a:rPr lang="en-US" smtClean="0"/>
-              <a:t>11/24/2020</a:t>
+              <a:t>11/30/2020</a:t>
             </a:fld>
             <a:endParaRPr lang="en-US"/>
           </a:p>
@@ -5697,6 +5707,36 @@
           <a:chExt cx="0" cy="0"/>
         </a:xfrm>
       </p:grpSpPr>
+      <p:pic>
+        <p:nvPicPr>
+          <p:cNvPr id="2" name="Picture 1">
+            <a:extLst>
+              <a:ext uri="{FF2B5EF4-FFF2-40B4-BE49-F238E27FC236}">
+                <a16:creationId xmlns:a16="http://schemas.microsoft.com/office/drawing/2014/main" id="{93209270-F4D5-4996-975D-62ECE74CDAE3}"/>
+              </a:ext>
+            </a:extLst>
+          </p:cNvPr>
+          <p:cNvPicPr>
+            <a:picLocks noChangeAspect="1"/>
+          </p:cNvPicPr>
+          <p:nvPr/>
+        </p:nvPicPr>
+        <p:blipFill>
+          <a:blip r:embed="rId2"/>
+          <a:stretch>
+            <a:fillRect/>
+          </a:stretch>
+        </p:blipFill>
+        <p:spPr>
+          <a:xfrm>
+            <a:off x="483928" y="161925"/>
+            <a:ext cx="10944225" cy="6534150"/>
+          </a:xfrm>
+          <a:prstGeom prst="rect">
+            <a:avLst/>
+          </a:prstGeom>
+        </p:spPr>
+      </p:pic>
     </p:spTree>
     <p:extLst>
       <p:ext uri="{BB962C8B-B14F-4D97-AF65-F5344CB8AC3E}">
@@ -5921,6 +5961,243 @@
 </p:sld>
 </file>
 
+<file path=ppt/slides/slide16.xml><?xml version="1.0" encoding="utf-8"?>
+<p:sld xmlns:a="http://schemas.openxmlformats.org/drawingml/2006/main" xmlns:r="http://schemas.openxmlformats.org/officeDocument/2006/relationships" xmlns:p="http://schemas.openxmlformats.org/presentationml/2006/main">
+  <p:cSld>
+    <p:spTree>
+      <p:nvGrpSpPr>
+        <p:cNvPr id="1" name=""/>
+        <p:cNvGrpSpPr/>
+        <p:nvPr/>
+      </p:nvGrpSpPr>
+      <p:grpSpPr>
+        <a:xfrm>
+          <a:off x="0" y="0"/>
+          <a:ext cx="0" cy="0"/>
+          <a:chOff x="0" y="0"/>
+          <a:chExt cx="0" cy="0"/>
+        </a:xfrm>
+      </p:grpSpPr>
+      <p:pic>
+        <p:nvPicPr>
+          <p:cNvPr id="4" name="Picture 3">
+            <a:extLst>
+              <a:ext uri="{FF2B5EF4-FFF2-40B4-BE49-F238E27FC236}">
+                <a16:creationId xmlns:a16="http://schemas.microsoft.com/office/drawing/2014/main" id="{DB92AD14-56BB-4E04-A864-CA260834BCBF}"/>
+              </a:ext>
+            </a:extLst>
+          </p:cNvPr>
+          <p:cNvPicPr>
+            <a:picLocks noChangeAspect="1"/>
+          </p:cNvPicPr>
+          <p:nvPr/>
+        </p:nvPicPr>
+        <p:blipFill rotWithShape="1">
+          <a:blip r:embed="rId2"/>
+          <a:srcRect l="20473" t="12230" r="15755" b="10088"/>
+          <a:stretch/>
+        </p:blipFill>
+        <p:spPr>
+          <a:xfrm>
+            <a:off x="2379306" y="1045028"/>
+            <a:ext cx="6979299" cy="5075853"/>
+          </a:xfrm>
+          <a:prstGeom prst="rect">
+            <a:avLst/>
+          </a:prstGeom>
+        </p:spPr>
+      </p:pic>
+    </p:spTree>
+    <p:extLst>
+      <p:ext uri="{BB962C8B-B14F-4D97-AF65-F5344CB8AC3E}">
+        <p14:creationId xmlns:p14="http://schemas.microsoft.com/office/powerpoint/2010/main" val="3553785741"/>
+      </p:ext>
+    </p:extLst>
+  </p:cSld>
+  <p:clrMapOvr>
+    <a:masterClrMapping/>
+  </p:clrMapOvr>
+</p:sld>
+</file>
+
+<file path=ppt/slides/slide17.xml><?xml version="1.0" encoding="utf-8"?>
+<p:sld xmlns:a="http://schemas.openxmlformats.org/drawingml/2006/main" xmlns:r="http://schemas.openxmlformats.org/officeDocument/2006/relationships" xmlns:p="http://schemas.openxmlformats.org/presentationml/2006/main">
+  <p:cSld>
+    <p:spTree>
+      <p:nvGrpSpPr>
+        <p:cNvPr id="1" name=""/>
+        <p:cNvGrpSpPr/>
+        <p:nvPr/>
+      </p:nvGrpSpPr>
+      <p:grpSpPr>
+        <a:xfrm>
+          <a:off x="0" y="0"/>
+          <a:ext cx="0" cy="0"/>
+          <a:chOff x="0" y="0"/>
+          <a:chExt cx="0" cy="0"/>
+        </a:xfrm>
+      </p:grpSpPr>
+      <p:pic>
+        <p:nvPicPr>
+          <p:cNvPr id="4" name="Picture 3">
+            <a:extLst>
+              <a:ext uri="{FF2B5EF4-FFF2-40B4-BE49-F238E27FC236}">
+                <a16:creationId xmlns:a16="http://schemas.microsoft.com/office/drawing/2014/main" id="{39B23DE5-B1E2-4F4B-8EB0-E37DAF0F026B}"/>
+              </a:ext>
+            </a:extLst>
+          </p:cNvPr>
+          <p:cNvPicPr>
+            <a:picLocks noChangeAspect="1"/>
+          </p:cNvPicPr>
+          <p:nvPr/>
+        </p:nvPicPr>
+        <p:blipFill rotWithShape="1">
+          <a:blip r:embed="rId2"/>
+          <a:srcRect l="25483" t="1763" r="11608" b="6143"/>
+          <a:stretch/>
+        </p:blipFill>
+        <p:spPr>
+          <a:xfrm>
+            <a:off x="2407298" y="319026"/>
+            <a:ext cx="7669764" cy="5848510"/>
+          </a:xfrm>
+          <a:prstGeom prst="rect">
+            <a:avLst/>
+          </a:prstGeom>
+        </p:spPr>
+      </p:pic>
+    </p:spTree>
+    <p:extLst>
+      <p:ext uri="{BB962C8B-B14F-4D97-AF65-F5344CB8AC3E}">
+        <p14:creationId xmlns:p14="http://schemas.microsoft.com/office/powerpoint/2010/main" val="2031990404"/>
+      </p:ext>
+    </p:extLst>
+  </p:cSld>
+  <p:clrMapOvr>
+    <a:masterClrMapping/>
+  </p:clrMapOvr>
+</p:sld>
+</file>
+
+<file path=ppt/slides/slide18.xml><?xml version="1.0" encoding="utf-8"?>
+<p:sld xmlns:a="http://schemas.openxmlformats.org/drawingml/2006/main" xmlns:r="http://schemas.openxmlformats.org/officeDocument/2006/relationships" xmlns:p="http://schemas.openxmlformats.org/presentationml/2006/main">
+  <p:cSld>
+    <p:spTree>
+      <p:nvGrpSpPr>
+        <p:cNvPr id="1" name=""/>
+        <p:cNvGrpSpPr/>
+        <p:nvPr/>
+      </p:nvGrpSpPr>
+      <p:grpSpPr>
+        <a:xfrm>
+          <a:off x="0" y="0"/>
+          <a:ext cx="0" cy="0"/>
+          <a:chOff x="0" y="0"/>
+          <a:chExt cx="0" cy="0"/>
+        </a:xfrm>
+      </p:grpSpPr>
+      <p:pic>
+        <p:nvPicPr>
+          <p:cNvPr id="4" name="Picture 3">
+            <a:extLst>
+              <a:ext uri="{FF2B5EF4-FFF2-40B4-BE49-F238E27FC236}">
+                <a16:creationId xmlns:a16="http://schemas.microsoft.com/office/drawing/2014/main" id="{903BB4BF-C361-4A78-B6A7-00204F94C94D}"/>
+              </a:ext>
+            </a:extLst>
+          </p:cNvPr>
+          <p:cNvPicPr>
+            <a:picLocks noChangeAspect="1"/>
+          </p:cNvPicPr>
+          <p:nvPr/>
+        </p:nvPicPr>
+        <p:blipFill rotWithShape="1">
+          <a:blip r:embed="rId2"/>
+          <a:srcRect l="27092" t="7171" r="13444" b="9228"/>
+          <a:stretch/>
+        </p:blipFill>
+        <p:spPr>
+          <a:xfrm>
+            <a:off x="2248676" y="643812"/>
+            <a:ext cx="7249887" cy="5309119"/>
+          </a:xfrm>
+          <a:prstGeom prst="rect">
+            <a:avLst/>
+          </a:prstGeom>
+        </p:spPr>
+      </p:pic>
+    </p:spTree>
+    <p:extLst>
+      <p:ext uri="{BB962C8B-B14F-4D97-AF65-F5344CB8AC3E}">
+        <p14:creationId xmlns:p14="http://schemas.microsoft.com/office/powerpoint/2010/main" val="946272854"/>
+      </p:ext>
+    </p:extLst>
+  </p:cSld>
+  <p:clrMapOvr>
+    <a:masterClrMapping/>
+  </p:clrMapOvr>
+</p:sld>
+</file>
+
+<file path=ppt/slides/slide19.xml><?xml version="1.0" encoding="utf-8"?>
+<p:sld xmlns:a="http://schemas.openxmlformats.org/drawingml/2006/main" xmlns:r="http://schemas.openxmlformats.org/officeDocument/2006/relationships" xmlns:p="http://schemas.openxmlformats.org/presentationml/2006/main">
+  <p:cSld>
+    <p:spTree>
+      <p:nvGrpSpPr>
+        <p:cNvPr id="1" name=""/>
+        <p:cNvGrpSpPr/>
+        <p:nvPr/>
+      </p:nvGrpSpPr>
+      <p:grpSpPr>
+        <a:xfrm>
+          <a:off x="0" y="0"/>
+          <a:ext cx="0" cy="0"/>
+          <a:chOff x="0" y="0"/>
+          <a:chExt cx="0" cy="0"/>
+        </a:xfrm>
+      </p:grpSpPr>
+      <p:pic>
+        <p:nvPicPr>
+          <p:cNvPr id="4" name="Picture 3">
+            <a:extLst>
+              <a:ext uri="{FF2B5EF4-FFF2-40B4-BE49-F238E27FC236}">
+                <a16:creationId xmlns:a16="http://schemas.microsoft.com/office/drawing/2014/main" id="{81ACABF5-4757-411D-8D46-343C72390C9E}"/>
+              </a:ext>
+            </a:extLst>
+          </p:cNvPr>
+          <p:cNvPicPr>
+            <a:picLocks noChangeAspect="1"/>
+          </p:cNvPicPr>
+          <p:nvPr/>
+        </p:nvPicPr>
+        <p:blipFill>
+          <a:blip r:embed="rId2"/>
+          <a:stretch>
+            <a:fillRect/>
+          </a:stretch>
+        </p:blipFill>
+        <p:spPr>
+          <a:xfrm>
+            <a:off x="0" y="253710"/>
+            <a:ext cx="12192000" cy="6350579"/>
+          </a:xfrm>
+          <a:prstGeom prst="rect">
+            <a:avLst/>
+          </a:prstGeom>
+        </p:spPr>
+      </p:pic>
+    </p:spTree>
+    <p:extLst>
+      <p:ext uri="{BB962C8B-B14F-4D97-AF65-F5344CB8AC3E}">
+        <p14:creationId xmlns:p14="http://schemas.microsoft.com/office/powerpoint/2010/main" val="1473500722"/>
+      </p:ext>
+    </p:extLst>
+  </p:cSld>
+  <p:clrMapOvr>
+    <a:masterClrMapping/>
+  </p:clrMapOvr>
+</p:sld>
+</file>
+
 <file path=ppt/slides/slide2.xml><?xml version="1.0" encoding="utf-8"?>
 <p:sld xmlns:a="http://schemas.openxmlformats.org/drawingml/2006/main" xmlns:r="http://schemas.openxmlformats.org/officeDocument/2006/relationships" xmlns:p="http://schemas.openxmlformats.org/presentationml/2006/main">
   <p:cSld>
@@ -6211,6 +6488,390 @@
     <p:extLst>
       <p:ext uri="{BB962C8B-B14F-4D97-AF65-F5344CB8AC3E}">
         <p14:creationId xmlns:p14="http://schemas.microsoft.com/office/powerpoint/2010/main" val="1014028602"/>
+      </p:ext>
+    </p:extLst>
+  </p:cSld>
+  <p:clrMapOvr>
+    <a:masterClrMapping/>
+  </p:clrMapOvr>
+</p:sld>
+</file>
+
+<file path=ppt/slides/slide20.xml><?xml version="1.0" encoding="utf-8"?>
+<p:sld xmlns:a="http://schemas.openxmlformats.org/drawingml/2006/main" xmlns:r="http://schemas.openxmlformats.org/officeDocument/2006/relationships" xmlns:p="http://schemas.openxmlformats.org/presentationml/2006/main">
+  <p:cSld>
+    <p:spTree>
+      <p:nvGrpSpPr>
+        <p:cNvPr id="1" name=""/>
+        <p:cNvGrpSpPr/>
+        <p:nvPr/>
+      </p:nvGrpSpPr>
+      <p:grpSpPr>
+        <a:xfrm>
+          <a:off x="0" y="0"/>
+          <a:ext cx="0" cy="0"/>
+          <a:chOff x="0" y="0"/>
+          <a:chExt cx="0" cy="0"/>
+        </a:xfrm>
+      </p:grpSpPr>
+      <p:pic>
+        <p:nvPicPr>
+          <p:cNvPr id="4" name="Picture 3">
+            <a:extLst>
+              <a:ext uri="{FF2B5EF4-FFF2-40B4-BE49-F238E27FC236}">
+                <a16:creationId xmlns:a16="http://schemas.microsoft.com/office/drawing/2014/main" id="{202FB080-56A3-4FEC-B7D8-9FACF6F1EA15}"/>
+              </a:ext>
+            </a:extLst>
+          </p:cNvPr>
+          <p:cNvPicPr>
+            <a:picLocks noChangeAspect="1"/>
+          </p:cNvPicPr>
+          <p:nvPr/>
+        </p:nvPicPr>
+        <p:blipFill rotWithShape="1">
+          <a:blip r:embed="rId2"/>
+          <a:srcRect l="29158" t="7759" r="16582" b="10256"/>
+          <a:stretch/>
+        </p:blipFill>
+        <p:spPr>
+          <a:xfrm>
+            <a:off x="2939142" y="755779"/>
+            <a:ext cx="6615405" cy="5206482"/>
+          </a:xfrm>
+          <a:prstGeom prst="rect">
+            <a:avLst/>
+          </a:prstGeom>
+        </p:spPr>
+      </p:pic>
+    </p:spTree>
+    <p:extLst>
+      <p:ext uri="{BB962C8B-B14F-4D97-AF65-F5344CB8AC3E}">
+        <p14:creationId xmlns:p14="http://schemas.microsoft.com/office/powerpoint/2010/main" val="3626693856"/>
+      </p:ext>
+    </p:extLst>
+  </p:cSld>
+  <p:clrMapOvr>
+    <a:masterClrMapping/>
+  </p:clrMapOvr>
+</p:sld>
+</file>
+
+<file path=ppt/slides/slide21.xml><?xml version="1.0" encoding="utf-8"?>
+<p:sld xmlns:a="http://schemas.openxmlformats.org/drawingml/2006/main" xmlns:r="http://schemas.openxmlformats.org/officeDocument/2006/relationships" xmlns:p="http://schemas.openxmlformats.org/presentationml/2006/main">
+  <p:cSld>
+    <p:spTree>
+      <p:nvGrpSpPr>
+        <p:cNvPr id="1" name=""/>
+        <p:cNvGrpSpPr/>
+        <p:nvPr/>
+      </p:nvGrpSpPr>
+      <p:grpSpPr>
+        <a:xfrm>
+          <a:off x="0" y="0"/>
+          <a:ext cx="0" cy="0"/>
+          <a:chOff x="0" y="0"/>
+          <a:chExt cx="0" cy="0"/>
+        </a:xfrm>
+      </p:grpSpPr>
+      <p:pic>
+        <p:nvPicPr>
+          <p:cNvPr id="4" name="Picture 3">
+            <a:extLst>
+              <a:ext uri="{FF2B5EF4-FFF2-40B4-BE49-F238E27FC236}">
+                <a16:creationId xmlns:a16="http://schemas.microsoft.com/office/drawing/2014/main" id="{B477B30F-606D-478E-89DE-AF19BDA39D70}"/>
+              </a:ext>
+            </a:extLst>
+          </p:cNvPr>
+          <p:cNvPicPr>
+            <a:picLocks noChangeAspect="1"/>
+          </p:cNvPicPr>
+          <p:nvPr/>
+        </p:nvPicPr>
+        <p:blipFill>
+          <a:blip r:embed="rId2"/>
+          <a:stretch>
+            <a:fillRect/>
+          </a:stretch>
+        </p:blipFill>
+        <p:spPr>
+          <a:xfrm>
+            <a:off x="391885" y="240565"/>
+            <a:ext cx="11672596" cy="6080032"/>
+          </a:xfrm>
+          <a:prstGeom prst="rect">
+            <a:avLst/>
+          </a:prstGeom>
+        </p:spPr>
+      </p:pic>
+    </p:spTree>
+    <p:extLst>
+      <p:ext uri="{BB962C8B-B14F-4D97-AF65-F5344CB8AC3E}">
+        <p14:creationId xmlns:p14="http://schemas.microsoft.com/office/powerpoint/2010/main" val="4173633677"/>
+      </p:ext>
+    </p:extLst>
+  </p:cSld>
+  <p:clrMapOvr>
+    <a:masterClrMapping/>
+  </p:clrMapOvr>
+</p:sld>
+</file>
+
+<file path=ppt/slides/slide22.xml><?xml version="1.0" encoding="utf-8"?>
+<p:sld xmlns:a="http://schemas.openxmlformats.org/drawingml/2006/main" xmlns:r="http://schemas.openxmlformats.org/officeDocument/2006/relationships" xmlns:p="http://schemas.openxmlformats.org/presentationml/2006/main">
+  <p:cSld>
+    <p:spTree>
+      <p:nvGrpSpPr>
+        <p:cNvPr id="1" name=""/>
+        <p:cNvGrpSpPr/>
+        <p:nvPr/>
+      </p:nvGrpSpPr>
+      <p:grpSpPr>
+        <a:xfrm>
+          <a:off x="0" y="0"/>
+          <a:ext cx="0" cy="0"/>
+          <a:chOff x="0" y="0"/>
+          <a:chExt cx="0" cy="0"/>
+        </a:xfrm>
+      </p:grpSpPr>
+      <p:pic>
+        <p:nvPicPr>
+          <p:cNvPr id="4" name="Picture 3">
+            <a:extLst>
+              <a:ext uri="{FF2B5EF4-FFF2-40B4-BE49-F238E27FC236}">
+                <a16:creationId xmlns:a16="http://schemas.microsoft.com/office/drawing/2014/main" id="{4D32E914-4320-47DB-932E-B13D4F5127A4}"/>
+              </a:ext>
+            </a:extLst>
+          </p:cNvPr>
+          <p:cNvPicPr>
+            <a:picLocks noChangeAspect="1"/>
+          </p:cNvPicPr>
+          <p:nvPr/>
+        </p:nvPicPr>
+        <p:blipFill rotWithShape="1">
+          <a:blip r:embed="rId2"/>
+          <a:srcRect l="25791" t="5114" r="16428" b="17456"/>
+          <a:stretch/>
+        </p:blipFill>
+        <p:spPr>
+          <a:xfrm>
+            <a:off x="2761861" y="774441"/>
+            <a:ext cx="7044612" cy="4917233"/>
+          </a:xfrm>
+          <a:prstGeom prst="rect">
+            <a:avLst/>
+          </a:prstGeom>
+        </p:spPr>
+      </p:pic>
+    </p:spTree>
+    <p:extLst>
+      <p:ext uri="{BB962C8B-B14F-4D97-AF65-F5344CB8AC3E}">
+        <p14:creationId xmlns:p14="http://schemas.microsoft.com/office/powerpoint/2010/main" val="2942407366"/>
+      </p:ext>
+    </p:extLst>
+  </p:cSld>
+  <p:clrMapOvr>
+    <a:masterClrMapping/>
+  </p:clrMapOvr>
+</p:sld>
+</file>
+
+<file path=ppt/slides/slide23.xml><?xml version="1.0" encoding="utf-8"?>
+<p:sld xmlns:a="http://schemas.openxmlformats.org/drawingml/2006/main" xmlns:r="http://schemas.openxmlformats.org/officeDocument/2006/relationships" xmlns:p="http://schemas.openxmlformats.org/presentationml/2006/main">
+  <p:cSld>
+    <p:spTree>
+      <p:nvGrpSpPr>
+        <p:cNvPr id="1" name=""/>
+        <p:cNvGrpSpPr/>
+        <p:nvPr/>
+      </p:nvGrpSpPr>
+      <p:grpSpPr>
+        <a:xfrm>
+          <a:off x="0" y="0"/>
+          <a:ext cx="0" cy="0"/>
+          <a:chOff x="0" y="0"/>
+          <a:chExt cx="0" cy="0"/>
+        </a:xfrm>
+      </p:grpSpPr>
+      <p:pic>
+        <p:nvPicPr>
+          <p:cNvPr id="4" name="Picture 3">
+            <a:extLst>
+              <a:ext uri="{FF2B5EF4-FFF2-40B4-BE49-F238E27FC236}">
+                <a16:creationId xmlns:a16="http://schemas.microsoft.com/office/drawing/2014/main" id="{A283330B-348E-4E48-9830-D7ED9CF6C8FE}"/>
+              </a:ext>
+            </a:extLst>
+          </p:cNvPr>
+          <p:cNvPicPr>
+            <a:picLocks noChangeAspect="1"/>
+          </p:cNvPicPr>
+          <p:nvPr/>
+        </p:nvPicPr>
+        <p:blipFill rotWithShape="1">
+          <a:blip r:embed="rId2"/>
+          <a:srcRect l="22654" t="8347" r="14897" b="6436"/>
+          <a:stretch/>
+        </p:blipFill>
+        <p:spPr>
+          <a:xfrm>
+            <a:off x="2146042" y="615823"/>
+            <a:ext cx="7613779" cy="5411754"/>
+          </a:xfrm>
+          <a:prstGeom prst="rect">
+            <a:avLst/>
+          </a:prstGeom>
+        </p:spPr>
+      </p:pic>
+    </p:spTree>
+    <p:extLst>
+      <p:ext uri="{BB962C8B-B14F-4D97-AF65-F5344CB8AC3E}">
+        <p14:creationId xmlns:p14="http://schemas.microsoft.com/office/powerpoint/2010/main" val="2104036638"/>
+      </p:ext>
+    </p:extLst>
+  </p:cSld>
+  <p:clrMapOvr>
+    <a:masterClrMapping/>
+  </p:clrMapOvr>
+</p:sld>
+</file>
+
+<file path=ppt/slides/slide24.xml><?xml version="1.0" encoding="utf-8"?>
+<p:sld xmlns:a="http://schemas.openxmlformats.org/drawingml/2006/main" xmlns:r="http://schemas.openxmlformats.org/officeDocument/2006/relationships" xmlns:p="http://schemas.openxmlformats.org/presentationml/2006/main">
+  <p:cSld>
+    <p:spTree>
+      <p:nvGrpSpPr>
+        <p:cNvPr id="1" name=""/>
+        <p:cNvGrpSpPr/>
+        <p:nvPr/>
+      </p:nvGrpSpPr>
+      <p:grpSpPr>
+        <a:xfrm>
+          <a:off x="0" y="0"/>
+          <a:ext cx="0" cy="0"/>
+          <a:chOff x="0" y="0"/>
+          <a:chExt cx="0" cy="0"/>
+        </a:xfrm>
+      </p:grpSpPr>
+      <p:pic>
+        <p:nvPicPr>
+          <p:cNvPr id="4" name="Picture 3">
+            <a:extLst>
+              <a:ext uri="{FF2B5EF4-FFF2-40B4-BE49-F238E27FC236}">
+                <a16:creationId xmlns:a16="http://schemas.microsoft.com/office/drawing/2014/main" id="{77DEFDAC-64C4-4951-A920-F6759F0E652A}"/>
+              </a:ext>
+            </a:extLst>
+          </p:cNvPr>
+          <p:cNvPicPr>
+            <a:picLocks noChangeAspect="1"/>
+          </p:cNvPicPr>
+          <p:nvPr/>
+        </p:nvPicPr>
+        <p:blipFill rotWithShape="1">
+          <a:blip r:embed="rId2"/>
+          <a:srcRect l="43856" t="15619" r="21869" b="15754"/>
+          <a:stretch/>
+        </p:blipFill>
+        <p:spPr>
+          <a:xfrm>
+            <a:off x="4739952" y="1283559"/>
+            <a:ext cx="3666930" cy="3824349"/>
+          </a:xfrm>
+          <a:prstGeom prst="rect">
+            <a:avLst/>
+          </a:prstGeom>
+        </p:spPr>
+      </p:pic>
+      <p:pic>
+        <p:nvPicPr>
+          <p:cNvPr id="5" name="Picture 4">
+            <a:extLst>
+              <a:ext uri="{FF2B5EF4-FFF2-40B4-BE49-F238E27FC236}">
+                <a16:creationId xmlns:a16="http://schemas.microsoft.com/office/drawing/2014/main" id="{CB29E8DA-C79A-41E2-B852-10E3DFF3CF5F}"/>
+              </a:ext>
+            </a:extLst>
+          </p:cNvPr>
+          <p:cNvPicPr>
+            <a:picLocks noChangeAspect="1"/>
+          </p:cNvPicPr>
+          <p:nvPr/>
+        </p:nvPicPr>
+        <p:blipFill rotWithShape="1">
+          <a:blip r:embed="rId3"/>
+          <a:srcRect l="47219" t="24831" r="14592" b="7731"/>
+          <a:stretch/>
+        </p:blipFill>
+        <p:spPr>
+          <a:xfrm>
+            <a:off x="335902" y="1365866"/>
+            <a:ext cx="4068146" cy="3742042"/>
+          </a:xfrm>
+          <a:prstGeom prst="rect">
+            <a:avLst/>
+          </a:prstGeom>
+        </p:spPr>
+      </p:pic>
+    </p:spTree>
+    <p:extLst>
+      <p:ext uri="{BB962C8B-B14F-4D97-AF65-F5344CB8AC3E}">
+        <p14:creationId xmlns:p14="http://schemas.microsoft.com/office/powerpoint/2010/main" val="1557658037"/>
+      </p:ext>
+    </p:extLst>
+  </p:cSld>
+  <p:clrMapOvr>
+    <a:masterClrMapping/>
+  </p:clrMapOvr>
+</p:sld>
+</file>
+
+<file path=ppt/slides/slide25.xml><?xml version="1.0" encoding="utf-8"?>
+<p:sld xmlns:a="http://schemas.openxmlformats.org/drawingml/2006/main" xmlns:r="http://schemas.openxmlformats.org/officeDocument/2006/relationships" xmlns:p="http://schemas.openxmlformats.org/presentationml/2006/main">
+  <p:cSld>
+    <p:spTree>
+      <p:nvGrpSpPr>
+        <p:cNvPr id="1" name=""/>
+        <p:cNvGrpSpPr/>
+        <p:nvPr/>
+      </p:nvGrpSpPr>
+      <p:grpSpPr>
+        <a:xfrm>
+          <a:off x="0" y="0"/>
+          <a:ext cx="0" cy="0"/>
+          <a:chOff x="0" y="0"/>
+          <a:chExt cx="0" cy="0"/>
+        </a:xfrm>
+      </p:grpSpPr>
+      <p:pic>
+        <p:nvPicPr>
+          <p:cNvPr id="4" name="Picture 3">
+            <a:extLst>
+              <a:ext uri="{FF2B5EF4-FFF2-40B4-BE49-F238E27FC236}">
+                <a16:creationId xmlns:a16="http://schemas.microsoft.com/office/drawing/2014/main" id="{4A3197A3-9905-4D6E-A881-1882FF871327}"/>
+              </a:ext>
+            </a:extLst>
+          </p:cNvPr>
+          <p:cNvPicPr>
+            <a:picLocks noChangeAspect="1"/>
+          </p:cNvPicPr>
+          <p:nvPr/>
+        </p:nvPicPr>
+        <p:blipFill rotWithShape="1">
+          <a:blip r:embed="rId2"/>
+          <a:srcRect l="47219" t="24831" r="14592" b="7731"/>
+          <a:stretch/>
+        </p:blipFill>
+        <p:spPr>
+          <a:xfrm>
+            <a:off x="3694922" y="1175657"/>
+            <a:ext cx="4422669" cy="4068146"/>
+          </a:xfrm>
+          <a:prstGeom prst="rect">
+            <a:avLst/>
+          </a:prstGeom>
+        </p:spPr>
+      </p:pic>
+    </p:spTree>
+    <p:extLst>
+      <p:ext uri="{BB962C8B-B14F-4D97-AF65-F5344CB8AC3E}">
+        <p14:creationId xmlns:p14="http://schemas.microsoft.com/office/powerpoint/2010/main" val="696976652"/>
       </p:ext>
     </p:extLst>
   </p:cSld>

</xml_diff>